<commit_message>
Update ARduino Hall Effect Keyes Sensor.pptx
</commit_message>
<xml_diff>
--- a/ARduino Hall Effect Keyes Sensor.pptx
+++ b/ARduino Hall Effect Keyes Sensor.pptx
@@ -104,6 +104,11 @@
       </a:defRPr>
     </a:lvl9pPr>
   </p:defaultTextStyle>
+  <p:extLst>
+    <p:ext uri="{EFAFB233-063F-42B5-8137-9DF3F51BA10A}">
+      <p15:sldGuideLst xmlns:p15="http://schemas.microsoft.com/office/powerpoint/2012/main"/>
+    </p:ext>
+  </p:extLst>
 </p:presentation>
 </file>
 
@@ -3343,7 +3348,7 @@
         </p:blipFill>
         <p:spPr>
           <a:xfrm>
-            <a:off x="1359763" y="840473"/>
+            <a:off x="1608337" y="574143"/>
             <a:ext cx="3897300" cy="4307041"/>
           </a:xfrm>
           <a:prstGeom prst="rect">
@@ -3373,7 +3378,7 @@
         </p:blipFill>
         <p:spPr>
           <a:xfrm>
-            <a:off x="6096000" y="840473"/>
+            <a:off x="6939379" y="1373133"/>
             <a:ext cx="4335627" cy="4307041"/>
           </a:xfrm>
           <a:prstGeom prst="rect">

</xml_diff>